<commit_message>
adds week 3 materials
</commit_message>
<xml_diff>
--- a/lecture_notes/BIT_2.pptx
+++ b/lecture_notes/BIT_2.pptx
@@ -5,18 +5,19 @@
     <p:sldMasterId id="2147483660" r:id="rId1"/>
   </p:sldMasterIdLst>
   <p:notesMasterIdLst>
-    <p:notesMasterId r:id="rId11"/>
+    <p:notesMasterId r:id="rId12"/>
   </p:notesMasterIdLst>
   <p:sldIdLst>
     <p:sldId id="256" r:id="rId2"/>
     <p:sldId id="257" r:id="rId3"/>
     <p:sldId id="258" r:id="rId4"/>
-    <p:sldId id="259" r:id="rId5"/>
-    <p:sldId id="260" r:id="rId6"/>
-    <p:sldId id="261" r:id="rId7"/>
-    <p:sldId id="262" r:id="rId8"/>
-    <p:sldId id="263" r:id="rId9"/>
-    <p:sldId id="264" r:id="rId10"/>
+    <p:sldId id="265" r:id="rId5"/>
+    <p:sldId id="259" r:id="rId6"/>
+    <p:sldId id="260" r:id="rId7"/>
+    <p:sldId id="261" r:id="rId8"/>
+    <p:sldId id="262" r:id="rId9"/>
+    <p:sldId id="263" r:id="rId10"/>
+    <p:sldId id="264" r:id="rId11"/>
   </p:sldIdLst>
   <p:sldSz cx="9144000" cy="6858000" type="screen4x3"/>
   <p:notesSz cx="6858000" cy="9144000"/>
@@ -205,7 +206,7 @@
           <a:p>
             <a:fld id="{6F704628-FD63-6D40-ADAF-B18E607582B8}" type="datetimeFigureOut">
               <a:rPr lang="tr-TR" smtClean="0"/>
-              <a:t>9.03.2025</a:t>
+              <a:t>12.03.2025</a:t>
             </a:fld>
             <a:endParaRPr lang="tr-TR"/>
           </a:p>
@@ -604,7 +605,7 @@
           <a:p>
             <a:fld id="{D59D1FFF-AC32-C349-997F-78463A7EB403}" type="datetimeFigureOut">
               <a:rPr lang="tr-TR" smtClean="0"/>
-              <a:t>9.03.2025</a:t>
+              <a:t>12.03.2025</a:t>
             </a:fld>
             <a:endParaRPr lang="tr-TR"/>
           </a:p>
@@ -774,7 +775,7 @@
           <a:p>
             <a:fld id="{D59D1FFF-AC32-C349-997F-78463A7EB403}" type="datetimeFigureOut">
               <a:rPr lang="tr-TR" smtClean="0"/>
-              <a:t>9.03.2025</a:t>
+              <a:t>12.03.2025</a:t>
             </a:fld>
             <a:endParaRPr lang="tr-TR"/>
           </a:p>
@@ -954,7 +955,7 @@
           <a:p>
             <a:fld id="{D59D1FFF-AC32-C349-997F-78463A7EB403}" type="datetimeFigureOut">
               <a:rPr lang="tr-TR" smtClean="0"/>
-              <a:t>9.03.2025</a:t>
+              <a:t>12.03.2025</a:t>
             </a:fld>
             <a:endParaRPr lang="tr-TR"/>
           </a:p>
@@ -1124,7 +1125,7 @@
           <a:p>
             <a:fld id="{D59D1FFF-AC32-C349-997F-78463A7EB403}" type="datetimeFigureOut">
               <a:rPr lang="tr-TR" smtClean="0"/>
-              <a:t>9.03.2025</a:t>
+              <a:t>12.03.2025</a:t>
             </a:fld>
             <a:endParaRPr lang="tr-TR"/>
           </a:p>
@@ -1370,7 +1371,7 @@
           <a:p>
             <a:fld id="{D59D1FFF-AC32-C349-997F-78463A7EB403}" type="datetimeFigureOut">
               <a:rPr lang="tr-TR" smtClean="0"/>
-              <a:t>9.03.2025</a:t>
+              <a:t>12.03.2025</a:t>
             </a:fld>
             <a:endParaRPr lang="tr-TR"/>
           </a:p>
@@ -1602,7 +1603,7 @@
           <a:p>
             <a:fld id="{D59D1FFF-AC32-C349-997F-78463A7EB403}" type="datetimeFigureOut">
               <a:rPr lang="tr-TR" smtClean="0"/>
-              <a:t>9.03.2025</a:t>
+              <a:t>12.03.2025</a:t>
             </a:fld>
             <a:endParaRPr lang="tr-TR"/>
           </a:p>
@@ -1969,7 +1970,7 @@
           <a:p>
             <a:fld id="{D59D1FFF-AC32-C349-997F-78463A7EB403}" type="datetimeFigureOut">
               <a:rPr lang="tr-TR" smtClean="0"/>
-              <a:t>9.03.2025</a:t>
+              <a:t>12.03.2025</a:t>
             </a:fld>
             <a:endParaRPr lang="tr-TR"/>
           </a:p>
@@ -2087,7 +2088,7 @@
           <a:p>
             <a:fld id="{D59D1FFF-AC32-C349-997F-78463A7EB403}" type="datetimeFigureOut">
               <a:rPr lang="tr-TR" smtClean="0"/>
-              <a:t>9.03.2025</a:t>
+              <a:t>12.03.2025</a:t>
             </a:fld>
             <a:endParaRPr lang="tr-TR"/>
           </a:p>
@@ -2182,7 +2183,7 @@
           <a:p>
             <a:fld id="{D59D1FFF-AC32-C349-997F-78463A7EB403}" type="datetimeFigureOut">
               <a:rPr lang="tr-TR" smtClean="0"/>
-              <a:t>9.03.2025</a:t>
+              <a:t>12.03.2025</a:t>
             </a:fld>
             <a:endParaRPr lang="tr-TR"/>
           </a:p>
@@ -2459,7 +2460,7 @@
           <a:p>
             <a:fld id="{D59D1FFF-AC32-C349-997F-78463A7EB403}" type="datetimeFigureOut">
               <a:rPr lang="tr-TR" smtClean="0"/>
-              <a:t>9.03.2025</a:t>
+              <a:t>12.03.2025</a:t>
             </a:fld>
             <a:endParaRPr lang="tr-TR"/>
           </a:p>
@@ -2716,7 +2717,7 @@
           <a:p>
             <a:fld id="{D59D1FFF-AC32-C349-997F-78463A7EB403}" type="datetimeFigureOut">
               <a:rPr lang="tr-TR" smtClean="0"/>
-              <a:t>9.03.2025</a:t>
+              <a:t>12.03.2025</a:t>
             </a:fld>
             <a:endParaRPr lang="tr-TR"/>
           </a:p>
@@ -2929,7 +2930,7 @@
           <a:p>
             <a:fld id="{D59D1FFF-AC32-C349-997F-78463A7EB403}" type="datetimeFigureOut">
               <a:rPr lang="tr-TR" smtClean="0"/>
-              <a:t>9.03.2025</a:t>
+              <a:t>12.03.2025</a:t>
             </a:fld>
             <a:endParaRPr lang="tr-TR"/>
           </a:p>
@@ -3465,6 +3466,425 @@
 </p:sld>
 </file>
 
+<file path=ppt/slides/slide10.xml><?xml version="1.0" encoding="utf-8"?>
+<p:sld xmlns:a="http://schemas.openxmlformats.org/drawingml/2006/main" xmlns:r="http://schemas.openxmlformats.org/officeDocument/2006/relationships" xmlns:p="http://schemas.openxmlformats.org/presentationml/2006/main">
+  <p:cSld>
+    <p:spTree>
+      <p:nvGrpSpPr>
+        <p:cNvPr id="1" name="">
+          <a:extLst>
+            <a:ext uri="{FF2B5EF4-FFF2-40B4-BE49-F238E27FC236}">
+              <a16:creationId xmlns:a16="http://schemas.microsoft.com/office/drawing/2014/main" id="{2CF0A182-63BC-C7F0-FDA5-83B7255E0C0D}"/>
+            </a:ext>
+          </a:extLst>
+        </p:cNvPr>
+        <p:cNvGrpSpPr/>
+        <p:nvPr/>
+      </p:nvGrpSpPr>
+      <p:grpSpPr>
+        <a:xfrm>
+          <a:off x="0" y="0"/>
+          <a:ext cx="0" cy="0"/>
+          <a:chOff x="0" y="0"/>
+          <a:chExt cx="0" cy="0"/>
+        </a:xfrm>
+      </p:grpSpPr>
+      <p:sp>
+        <p:nvSpPr>
+          <p:cNvPr id="2" name="Title 1">
+            <a:extLst>
+              <a:ext uri="{FF2B5EF4-FFF2-40B4-BE49-F238E27FC236}">
+                <a16:creationId xmlns:a16="http://schemas.microsoft.com/office/drawing/2014/main" id="{24949099-5644-E120-201B-0799E044C890}"/>
+              </a:ext>
+            </a:extLst>
+          </p:cNvPr>
+          <p:cNvSpPr>
+            <a:spLocks noGrp="1"/>
+          </p:cNvSpPr>
+          <p:nvPr>
+            <p:ph type="title"/>
+          </p:nvPr>
+        </p:nvSpPr>
+        <p:spPr/>
+        <p:txBody>
+          <a:bodyPr/>
+          <a:lstStyle/>
+          <a:p>
+            <a:r>
+              <a:rPr lang="en-US" noProof="0" dirty="0"/>
+              <a:t>Strings</a:t>
+            </a:r>
+          </a:p>
+        </p:txBody>
+      </p:sp>
+      <p:sp>
+        <p:nvSpPr>
+          <p:cNvPr id="3" name="Content Placeholder 2">
+            <a:extLst>
+              <a:ext uri="{FF2B5EF4-FFF2-40B4-BE49-F238E27FC236}">
+                <a16:creationId xmlns:a16="http://schemas.microsoft.com/office/drawing/2014/main" id="{8893AE54-258A-70C5-6BB6-2FA36098E52D}"/>
+              </a:ext>
+            </a:extLst>
+          </p:cNvPr>
+          <p:cNvSpPr>
+            <a:spLocks noGrp="1"/>
+          </p:cNvSpPr>
+          <p:nvPr>
+            <p:ph idx="1"/>
+          </p:nvPr>
+        </p:nvSpPr>
+        <p:spPr/>
+        <p:txBody>
+          <a:bodyPr>
+            <a:normAutofit/>
+          </a:bodyPr>
+          <a:lstStyle/>
+          <a:p>
+            <a:r>
+              <a:rPr lang="en-US" sz="2400" dirty="0"/>
+              <a:t>To get the length of a string, use the </a:t>
+            </a:r>
+            <a:r>
+              <a:rPr lang="en-US" sz="2400" dirty="0" err="1"/>
+              <a:t>len</a:t>
+            </a:r>
+            <a:r>
+              <a:rPr lang="en-US" sz="2400" dirty="0"/>
+              <a:t>() function.</a:t>
+            </a:r>
+          </a:p>
+          <a:p>
+            <a:r>
+              <a:rPr lang="en-US" sz="2400" dirty="0">
+                <a:solidFill>
+                  <a:srgbClr val="000000"/>
+                </a:solidFill>
+                <a:effectLst/>
+              </a:rPr>
+              <a:t>a = </a:t>
+            </a:r>
+            <a:r>
+              <a:rPr lang="en-US" sz="2400" dirty="0">
+                <a:solidFill>
+                  <a:srgbClr val="008000"/>
+                </a:solidFill>
+                <a:effectLst/>
+              </a:rPr>
+              <a:t>"Hello, World!"</a:t>
+            </a:r>
+            <a:br>
+              <a:rPr lang="en-US" sz="2400" dirty="0">
+                <a:solidFill>
+                  <a:srgbClr val="000000"/>
+                </a:solidFill>
+                <a:effectLst/>
+              </a:rPr>
+            </a:br>
+            <a:r>
+              <a:rPr lang="en-US" sz="2400" dirty="0">
+                <a:solidFill>
+                  <a:srgbClr val="005CC5"/>
+                </a:solidFill>
+                <a:effectLst/>
+              </a:rPr>
+              <a:t>print</a:t>
+            </a:r>
+            <a:r>
+              <a:rPr lang="en-US" sz="2400" dirty="0">
+                <a:solidFill>
+                  <a:srgbClr val="000000"/>
+                </a:solidFill>
+                <a:effectLst/>
+              </a:rPr>
+              <a:t>(</a:t>
+            </a:r>
+            <a:r>
+              <a:rPr lang="en-US" sz="2400" dirty="0" err="1">
+                <a:solidFill>
+                  <a:srgbClr val="005CC5"/>
+                </a:solidFill>
+                <a:effectLst/>
+              </a:rPr>
+              <a:t>len</a:t>
+            </a:r>
+            <a:r>
+              <a:rPr lang="en-US" sz="2400" dirty="0">
+                <a:solidFill>
+                  <a:srgbClr val="000000"/>
+                </a:solidFill>
+                <a:effectLst/>
+              </a:rPr>
+              <a:t>(a))</a:t>
+            </a:r>
+          </a:p>
+          <a:p>
+            <a:r>
+              <a:rPr lang="en-US" sz="2400" dirty="0"/>
+              <a:t>To check if a certain phrase or character is present in a string, we can use the keyword </a:t>
+            </a:r>
+            <a:r>
+              <a:rPr lang="en-US" sz="2400" dirty="0">
+                <a:solidFill>
+                  <a:srgbClr val="FF0000"/>
+                </a:solidFill>
+              </a:rPr>
+              <a:t>in</a:t>
+            </a:r>
+            <a:r>
+              <a:rPr lang="en-US" sz="2400" dirty="0"/>
+              <a:t>.</a:t>
+            </a:r>
+          </a:p>
+          <a:p>
+            <a:r>
+              <a:rPr lang="en-US" sz="2400" dirty="0">
+                <a:solidFill>
+                  <a:srgbClr val="000000"/>
+                </a:solidFill>
+                <a:effectLst/>
+              </a:rPr>
+              <a:t>txt = </a:t>
+            </a:r>
+            <a:r>
+              <a:rPr lang="en-US" sz="2400" dirty="0">
+                <a:solidFill>
+                  <a:srgbClr val="008000"/>
+                </a:solidFill>
+                <a:effectLst/>
+              </a:rPr>
+              <a:t>"The best things in life are free!"</a:t>
+            </a:r>
+            <a:br>
+              <a:rPr lang="en-US" sz="2400" dirty="0">
+                <a:solidFill>
+                  <a:srgbClr val="000000"/>
+                </a:solidFill>
+                <a:effectLst/>
+              </a:rPr>
+            </a:br>
+            <a:r>
+              <a:rPr lang="en-US" sz="2400" dirty="0">
+                <a:solidFill>
+                  <a:srgbClr val="005CC5"/>
+                </a:solidFill>
+                <a:effectLst/>
+              </a:rPr>
+              <a:t>print</a:t>
+            </a:r>
+            <a:r>
+              <a:rPr lang="en-US" sz="2400" dirty="0">
+                <a:solidFill>
+                  <a:srgbClr val="000000"/>
+                </a:solidFill>
+                <a:effectLst/>
+              </a:rPr>
+              <a:t>(</a:t>
+            </a:r>
+            <a:r>
+              <a:rPr lang="en-US" sz="2400" dirty="0">
+                <a:solidFill>
+                  <a:srgbClr val="008000"/>
+                </a:solidFill>
+                <a:effectLst/>
+              </a:rPr>
+              <a:t>"free"</a:t>
+            </a:r>
+            <a:r>
+              <a:rPr lang="en-US" sz="2400" dirty="0">
+                <a:solidFill>
+                  <a:srgbClr val="000000"/>
+                </a:solidFill>
+                <a:effectLst/>
+              </a:rPr>
+              <a:t> </a:t>
+            </a:r>
+            <a:r>
+              <a:rPr lang="en-US" sz="2400" dirty="0">
+                <a:solidFill>
+                  <a:srgbClr val="005CC5"/>
+                </a:solidFill>
+                <a:effectLst/>
+              </a:rPr>
+              <a:t>in</a:t>
+            </a:r>
+            <a:r>
+              <a:rPr lang="en-US" sz="2400" dirty="0">
+                <a:solidFill>
+                  <a:srgbClr val="000000"/>
+                </a:solidFill>
+                <a:effectLst/>
+              </a:rPr>
+              <a:t> txt)</a:t>
+            </a:r>
+          </a:p>
+          <a:p>
+            <a:r>
+              <a:rPr lang="en-US" sz="2400" dirty="0"/>
+              <a:t>To check if a certain phrase or character is NOT present in a string, we can use the keyword </a:t>
+            </a:r>
+            <a:r>
+              <a:rPr lang="en-US" sz="2400" dirty="0">
+                <a:solidFill>
+                  <a:srgbClr val="FF0000"/>
+                </a:solidFill>
+              </a:rPr>
+              <a:t>not in</a:t>
+            </a:r>
+            <a:r>
+              <a:rPr lang="en-US" sz="2400" dirty="0"/>
+              <a:t>.</a:t>
+            </a:r>
+          </a:p>
+          <a:p>
+            <a:r>
+              <a:rPr lang="en-US" sz="2400" dirty="0">
+                <a:solidFill>
+                  <a:srgbClr val="000000"/>
+                </a:solidFill>
+                <a:effectLst/>
+              </a:rPr>
+              <a:t>txt = </a:t>
+            </a:r>
+            <a:r>
+              <a:rPr lang="en-US" sz="2400" dirty="0">
+                <a:solidFill>
+                  <a:srgbClr val="008000"/>
+                </a:solidFill>
+                <a:effectLst/>
+              </a:rPr>
+              <a:t>"The best things in life are free!"</a:t>
+            </a:r>
+            <a:br>
+              <a:rPr lang="en-US" sz="2400" dirty="0">
+                <a:solidFill>
+                  <a:srgbClr val="000000"/>
+                </a:solidFill>
+                <a:effectLst/>
+              </a:rPr>
+            </a:br>
+            <a:r>
+              <a:rPr lang="en-US" sz="2400" dirty="0">
+                <a:solidFill>
+                  <a:srgbClr val="005CC5"/>
+                </a:solidFill>
+                <a:effectLst/>
+              </a:rPr>
+              <a:t>print</a:t>
+            </a:r>
+            <a:r>
+              <a:rPr lang="en-US" sz="2400" dirty="0">
+                <a:solidFill>
+                  <a:srgbClr val="000000"/>
+                </a:solidFill>
+                <a:effectLst/>
+              </a:rPr>
+              <a:t>(</a:t>
+            </a:r>
+            <a:r>
+              <a:rPr lang="en-US" sz="2400" dirty="0">
+                <a:solidFill>
+                  <a:srgbClr val="008000"/>
+                </a:solidFill>
+                <a:effectLst/>
+              </a:rPr>
+              <a:t>"expensive"</a:t>
+            </a:r>
+            <a:r>
+              <a:rPr lang="en-US" sz="2400" dirty="0">
+                <a:solidFill>
+                  <a:srgbClr val="000000"/>
+                </a:solidFill>
+                <a:effectLst/>
+              </a:rPr>
+              <a:t> not </a:t>
+            </a:r>
+            <a:r>
+              <a:rPr lang="en-US" sz="2400" dirty="0">
+                <a:solidFill>
+                  <a:srgbClr val="005CC5"/>
+                </a:solidFill>
+                <a:effectLst/>
+              </a:rPr>
+              <a:t>in</a:t>
+            </a:r>
+            <a:r>
+              <a:rPr lang="en-US" sz="2400" dirty="0">
+                <a:solidFill>
+                  <a:srgbClr val="000000"/>
+                </a:solidFill>
+                <a:effectLst/>
+              </a:rPr>
+              <a:t> txt)</a:t>
+            </a:r>
+            <a:endParaRPr lang="en-US" sz="3600" dirty="0"/>
+          </a:p>
+        </p:txBody>
+      </p:sp>
+      <p:sp>
+        <p:nvSpPr>
+          <p:cNvPr id="4" name="TextBox 3">
+            <a:extLst>
+              <a:ext uri="{FF2B5EF4-FFF2-40B4-BE49-F238E27FC236}">
+                <a16:creationId xmlns:a16="http://schemas.microsoft.com/office/drawing/2014/main" id="{26AE9647-0CFD-278E-DC72-FF410F182F52}"/>
+              </a:ext>
+            </a:extLst>
+          </p:cNvPr>
+          <p:cNvSpPr txBox="1"/>
+          <p:nvPr/>
+        </p:nvSpPr>
+        <p:spPr>
+          <a:xfrm>
+            <a:off x="628650" y="6311899"/>
+            <a:ext cx="5770041" cy="369332"/>
+          </a:xfrm>
+          <a:prstGeom prst="rect">
+            <a:avLst/>
+          </a:prstGeom>
+          <a:noFill/>
+        </p:spPr>
+        <p:txBody>
+          <a:bodyPr wrap="none" rtlCol="0">
+            <a:spAutoFit/>
+          </a:bodyPr>
+          <a:lstStyle/>
+          <a:p>
+            <a:r>
+              <a:rPr lang="tr-TR" dirty="0" err="1"/>
+              <a:t>https</a:t>
+            </a:r>
+            <a:r>
+              <a:rPr lang="tr-TR" dirty="0"/>
+              <a:t>://www.w3schools.com/</a:t>
+            </a:r>
+            <a:r>
+              <a:rPr lang="tr-TR" dirty="0" err="1"/>
+              <a:t>python</a:t>
+            </a:r>
+            <a:r>
+              <a:rPr lang="tr-TR" dirty="0"/>
+              <a:t>/</a:t>
+            </a:r>
+            <a:r>
+              <a:rPr lang="tr-TR" dirty="0" err="1"/>
+              <a:t>python_strings.asp</a:t>
+            </a:r>
+            <a:endParaRPr lang="tr-TR" dirty="0"/>
+          </a:p>
+        </p:txBody>
+      </p:sp>
+    </p:spTree>
+    <p:extLst>
+      <p:ext uri="{BB962C8B-B14F-4D97-AF65-F5344CB8AC3E}">
+        <p14:creationId xmlns:p14="http://schemas.microsoft.com/office/powerpoint/2010/main" val="2936963030"/>
+      </p:ext>
+    </p:extLst>
+  </p:cSld>
+  <p:clrMapOvr>
+    <a:masterClrMapping/>
+  </p:clrMapOvr>
+</p:sld>
+</file>
+
 <file path=ppt/slides/slide2.xml><?xml version="1.0" encoding="utf-8"?>
 <p:sld xmlns:a="http://schemas.openxmlformats.org/drawingml/2006/main" xmlns:r="http://schemas.openxmlformats.org/officeDocument/2006/relationships" xmlns:p="http://schemas.openxmlformats.org/presentationml/2006/main">
   <p:cSld>
@@ -3727,6 +4147,70 @@
         <p:cNvPr id="1" name="">
           <a:extLst>
             <a:ext uri="{FF2B5EF4-FFF2-40B4-BE49-F238E27FC236}">
+              <a16:creationId xmlns:a16="http://schemas.microsoft.com/office/drawing/2014/main" id="{F7933D97-48A9-E2CE-D1BE-26990BC324DE}"/>
+            </a:ext>
+          </a:extLst>
+        </p:cNvPr>
+        <p:cNvGrpSpPr/>
+        <p:nvPr/>
+      </p:nvGrpSpPr>
+      <p:grpSpPr>
+        <a:xfrm>
+          <a:off x="0" y="0"/>
+          <a:ext cx="0" cy="0"/>
+          <a:chOff x="0" y="0"/>
+          <a:chExt cx="0" cy="0"/>
+        </a:xfrm>
+      </p:grpSpPr>
+      <p:sp>
+        <p:nvSpPr>
+          <p:cNvPr id="2" name="Title 1">
+            <a:extLst>
+              <a:ext uri="{FF2B5EF4-FFF2-40B4-BE49-F238E27FC236}">
+                <a16:creationId xmlns:a16="http://schemas.microsoft.com/office/drawing/2014/main" id="{3AB4EA63-0A0C-4E08-9867-A7D406341732}"/>
+              </a:ext>
+            </a:extLst>
+          </p:cNvPr>
+          <p:cNvSpPr>
+            <a:spLocks noGrp="1"/>
+          </p:cNvSpPr>
+          <p:nvPr>
+            <p:ph type="title"/>
+          </p:nvPr>
+        </p:nvSpPr>
+        <p:spPr/>
+        <p:txBody>
+          <a:bodyPr/>
+          <a:lstStyle/>
+          <a:p>
+            <a:r>
+              <a:rPr lang="en-US" noProof="0" dirty="0"/>
+              <a:t>Variables</a:t>
+            </a:r>
+          </a:p>
+        </p:txBody>
+      </p:sp>
+    </p:spTree>
+    <p:extLst>
+      <p:ext uri="{BB962C8B-B14F-4D97-AF65-F5344CB8AC3E}">
+        <p14:creationId xmlns:p14="http://schemas.microsoft.com/office/powerpoint/2010/main" val="3105401859"/>
+      </p:ext>
+    </p:extLst>
+  </p:cSld>
+  <p:clrMapOvr>
+    <a:masterClrMapping/>
+  </p:clrMapOvr>
+</p:sld>
+</file>
+
+<file path=ppt/slides/slide5.xml><?xml version="1.0" encoding="utf-8"?>
+<p:sld xmlns:a="http://schemas.openxmlformats.org/drawingml/2006/main" xmlns:r="http://schemas.openxmlformats.org/officeDocument/2006/relationships" xmlns:p="http://schemas.openxmlformats.org/presentationml/2006/main">
+  <p:cSld>
+    <p:spTree>
+      <p:nvGrpSpPr>
+        <p:cNvPr id="1" name="">
+          <a:extLst>
+            <a:ext uri="{FF2B5EF4-FFF2-40B4-BE49-F238E27FC236}">
               <a16:creationId xmlns:a16="http://schemas.microsoft.com/office/drawing/2014/main" id="{C04A55E1-6EA6-9C98-0197-AB670A290E41}"/>
             </a:ext>
           </a:extLst>
@@ -3932,7 +4416,7 @@
 </p:sld>
 </file>
 
-<file path=ppt/slides/slide5.xml><?xml version="1.0" encoding="utf-8"?>
+<file path=ppt/slides/slide6.xml><?xml version="1.0" encoding="utf-8"?>
 <p:sld xmlns:a="http://schemas.openxmlformats.org/drawingml/2006/main" xmlns:r="http://schemas.openxmlformats.org/officeDocument/2006/relationships" xmlns:p="http://schemas.openxmlformats.org/presentationml/2006/main">
   <p:cSld>
     <p:spTree>
@@ -4237,7 +4721,7 @@
 </p:sld>
 </file>
 
-<file path=ppt/slides/slide6.xml><?xml version="1.0" encoding="utf-8"?>
+<file path=ppt/slides/slide7.xml><?xml version="1.0" encoding="utf-8"?>
 <p:sld xmlns:a="http://schemas.openxmlformats.org/drawingml/2006/main" xmlns:r="http://schemas.openxmlformats.org/officeDocument/2006/relationships" xmlns:p="http://schemas.openxmlformats.org/presentationml/2006/main">
   <p:cSld>
     <p:spTree>
@@ -4539,7 +5023,7 @@
 </p:sld>
 </file>
 
-<file path=ppt/slides/slide7.xml><?xml version="1.0" encoding="utf-8"?>
+<file path=ppt/slides/slide8.xml><?xml version="1.0" encoding="utf-8"?>
 <p:sld xmlns:a="http://schemas.openxmlformats.org/drawingml/2006/main" xmlns:r="http://schemas.openxmlformats.org/officeDocument/2006/relationships" xmlns:p="http://schemas.openxmlformats.org/presentationml/2006/main">
   <p:cSld>
     <p:spTree>
@@ -4780,7 +5264,7 @@
 </p:sld>
 </file>
 
-<file path=ppt/slides/slide8.xml><?xml version="1.0" encoding="utf-8"?>
+<file path=ppt/slides/slide9.xml><?xml version="1.0" encoding="utf-8"?>
 <p:sld xmlns:a="http://schemas.openxmlformats.org/drawingml/2006/main" xmlns:r="http://schemas.openxmlformats.org/officeDocument/2006/relationships" xmlns:p="http://schemas.openxmlformats.org/presentationml/2006/main">
   <p:cSld>
     <p:spTree>
@@ -5252,425 +5736,6 @@
     <p:extLst>
       <p:ext uri="{BB962C8B-B14F-4D97-AF65-F5344CB8AC3E}">
         <p14:creationId xmlns:p14="http://schemas.microsoft.com/office/powerpoint/2010/main" val="3733330918"/>
-      </p:ext>
-    </p:extLst>
-  </p:cSld>
-  <p:clrMapOvr>
-    <a:masterClrMapping/>
-  </p:clrMapOvr>
-</p:sld>
-</file>
-
-<file path=ppt/slides/slide9.xml><?xml version="1.0" encoding="utf-8"?>
-<p:sld xmlns:a="http://schemas.openxmlformats.org/drawingml/2006/main" xmlns:r="http://schemas.openxmlformats.org/officeDocument/2006/relationships" xmlns:p="http://schemas.openxmlformats.org/presentationml/2006/main">
-  <p:cSld>
-    <p:spTree>
-      <p:nvGrpSpPr>
-        <p:cNvPr id="1" name="">
-          <a:extLst>
-            <a:ext uri="{FF2B5EF4-FFF2-40B4-BE49-F238E27FC236}">
-              <a16:creationId xmlns:a16="http://schemas.microsoft.com/office/drawing/2014/main" id="{2CF0A182-63BC-C7F0-FDA5-83B7255E0C0D}"/>
-            </a:ext>
-          </a:extLst>
-        </p:cNvPr>
-        <p:cNvGrpSpPr/>
-        <p:nvPr/>
-      </p:nvGrpSpPr>
-      <p:grpSpPr>
-        <a:xfrm>
-          <a:off x="0" y="0"/>
-          <a:ext cx="0" cy="0"/>
-          <a:chOff x="0" y="0"/>
-          <a:chExt cx="0" cy="0"/>
-        </a:xfrm>
-      </p:grpSpPr>
-      <p:sp>
-        <p:nvSpPr>
-          <p:cNvPr id="2" name="Title 1">
-            <a:extLst>
-              <a:ext uri="{FF2B5EF4-FFF2-40B4-BE49-F238E27FC236}">
-                <a16:creationId xmlns:a16="http://schemas.microsoft.com/office/drawing/2014/main" id="{24949099-5644-E120-201B-0799E044C890}"/>
-              </a:ext>
-            </a:extLst>
-          </p:cNvPr>
-          <p:cNvSpPr>
-            <a:spLocks noGrp="1"/>
-          </p:cNvSpPr>
-          <p:nvPr>
-            <p:ph type="title"/>
-          </p:nvPr>
-        </p:nvSpPr>
-        <p:spPr/>
-        <p:txBody>
-          <a:bodyPr/>
-          <a:lstStyle/>
-          <a:p>
-            <a:r>
-              <a:rPr lang="en-US" noProof="0" dirty="0"/>
-              <a:t>Strings</a:t>
-            </a:r>
-          </a:p>
-        </p:txBody>
-      </p:sp>
-      <p:sp>
-        <p:nvSpPr>
-          <p:cNvPr id="3" name="Content Placeholder 2">
-            <a:extLst>
-              <a:ext uri="{FF2B5EF4-FFF2-40B4-BE49-F238E27FC236}">
-                <a16:creationId xmlns:a16="http://schemas.microsoft.com/office/drawing/2014/main" id="{8893AE54-258A-70C5-6BB6-2FA36098E52D}"/>
-              </a:ext>
-            </a:extLst>
-          </p:cNvPr>
-          <p:cNvSpPr>
-            <a:spLocks noGrp="1"/>
-          </p:cNvSpPr>
-          <p:nvPr>
-            <p:ph idx="1"/>
-          </p:nvPr>
-        </p:nvSpPr>
-        <p:spPr/>
-        <p:txBody>
-          <a:bodyPr>
-            <a:normAutofit/>
-          </a:bodyPr>
-          <a:lstStyle/>
-          <a:p>
-            <a:r>
-              <a:rPr lang="en-US" sz="2400" dirty="0"/>
-              <a:t>To get the length of a string, use the </a:t>
-            </a:r>
-            <a:r>
-              <a:rPr lang="en-US" sz="2400" dirty="0" err="1"/>
-              <a:t>len</a:t>
-            </a:r>
-            <a:r>
-              <a:rPr lang="en-US" sz="2400" dirty="0"/>
-              <a:t>() function.</a:t>
-            </a:r>
-          </a:p>
-          <a:p>
-            <a:r>
-              <a:rPr lang="en-US" sz="2400" dirty="0">
-                <a:solidFill>
-                  <a:srgbClr val="000000"/>
-                </a:solidFill>
-                <a:effectLst/>
-              </a:rPr>
-              <a:t>a = </a:t>
-            </a:r>
-            <a:r>
-              <a:rPr lang="en-US" sz="2400" dirty="0">
-                <a:solidFill>
-                  <a:srgbClr val="008000"/>
-                </a:solidFill>
-                <a:effectLst/>
-              </a:rPr>
-              <a:t>"Hello, World!"</a:t>
-            </a:r>
-            <a:br>
-              <a:rPr lang="en-US" sz="2400" dirty="0">
-                <a:solidFill>
-                  <a:srgbClr val="000000"/>
-                </a:solidFill>
-                <a:effectLst/>
-              </a:rPr>
-            </a:br>
-            <a:r>
-              <a:rPr lang="en-US" sz="2400" dirty="0">
-                <a:solidFill>
-                  <a:srgbClr val="005CC5"/>
-                </a:solidFill>
-                <a:effectLst/>
-              </a:rPr>
-              <a:t>print</a:t>
-            </a:r>
-            <a:r>
-              <a:rPr lang="en-US" sz="2400" dirty="0">
-                <a:solidFill>
-                  <a:srgbClr val="000000"/>
-                </a:solidFill>
-                <a:effectLst/>
-              </a:rPr>
-              <a:t>(</a:t>
-            </a:r>
-            <a:r>
-              <a:rPr lang="en-US" sz="2400" dirty="0" err="1">
-                <a:solidFill>
-                  <a:srgbClr val="005CC5"/>
-                </a:solidFill>
-                <a:effectLst/>
-              </a:rPr>
-              <a:t>len</a:t>
-            </a:r>
-            <a:r>
-              <a:rPr lang="en-US" sz="2400" dirty="0">
-                <a:solidFill>
-                  <a:srgbClr val="000000"/>
-                </a:solidFill>
-                <a:effectLst/>
-              </a:rPr>
-              <a:t>(a))</a:t>
-            </a:r>
-          </a:p>
-          <a:p>
-            <a:r>
-              <a:rPr lang="en-US" sz="2400" dirty="0"/>
-              <a:t>To check if a certain phrase or character is present in a string, we can use the keyword </a:t>
-            </a:r>
-            <a:r>
-              <a:rPr lang="en-US" sz="2400" dirty="0">
-                <a:solidFill>
-                  <a:srgbClr val="FF0000"/>
-                </a:solidFill>
-              </a:rPr>
-              <a:t>in</a:t>
-            </a:r>
-            <a:r>
-              <a:rPr lang="en-US" sz="2400" dirty="0"/>
-              <a:t>.</a:t>
-            </a:r>
-          </a:p>
-          <a:p>
-            <a:r>
-              <a:rPr lang="en-US" sz="2400" dirty="0">
-                <a:solidFill>
-                  <a:srgbClr val="000000"/>
-                </a:solidFill>
-                <a:effectLst/>
-              </a:rPr>
-              <a:t>txt = </a:t>
-            </a:r>
-            <a:r>
-              <a:rPr lang="en-US" sz="2400" dirty="0">
-                <a:solidFill>
-                  <a:srgbClr val="008000"/>
-                </a:solidFill>
-                <a:effectLst/>
-              </a:rPr>
-              <a:t>"The best things in life are free!"</a:t>
-            </a:r>
-            <a:br>
-              <a:rPr lang="en-US" sz="2400" dirty="0">
-                <a:solidFill>
-                  <a:srgbClr val="000000"/>
-                </a:solidFill>
-                <a:effectLst/>
-              </a:rPr>
-            </a:br>
-            <a:r>
-              <a:rPr lang="en-US" sz="2400" dirty="0">
-                <a:solidFill>
-                  <a:srgbClr val="005CC5"/>
-                </a:solidFill>
-                <a:effectLst/>
-              </a:rPr>
-              <a:t>print</a:t>
-            </a:r>
-            <a:r>
-              <a:rPr lang="en-US" sz="2400" dirty="0">
-                <a:solidFill>
-                  <a:srgbClr val="000000"/>
-                </a:solidFill>
-                <a:effectLst/>
-              </a:rPr>
-              <a:t>(</a:t>
-            </a:r>
-            <a:r>
-              <a:rPr lang="en-US" sz="2400" dirty="0">
-                <a:solidFill>
-                  <a:srgbClr val="008000"/>
-                </a:solidFill>
-                <a:effectLst/>
-              </a:rPr>
-              <a:t>"free"</a:t>
-            </a:r>
-            <a:r>
-              <a:rPr lang="en-US" sz="2400" dirty="0">
-                <a:solidFill>
-                  <a:srgbClr val="000000"/>
-                </a:solidFill>
-                <a:effectLst/>
-              </a:rPr>
-              <a:t> </a:t>
-            </a:r>
-            <a:r>
-              <a:rPr lang="en-US" sz="2400" dirty="0">
-                <a:solidFill>
-                  <a:srgbClr val="005CC5"/>
-                </a:solidFill>
-                <a:effectLst/>
-              </a:rPr>
-              <a:t>in</a:t>
-            </a:r>
-            <a:r>
-              <a:rPr lang="en-US" sz="2400" dirty="0">
-                <a:solidFill>
-                  <a:srgbClr val="000000"/>
-                </a:solidFill>
-                <a:effectLst/>
-              </a:rPr>
-              <a:t> txt)</a:t>
-            </a:r>
-          </a:p>
-          <a:p>
-            <a:r>
-              <a:rPr lang="en-US" sz="2400" dirty="0"/>
-              <a:t>To check if a certain phrase or character is NOT present in a string, we can use the keyword </a:t>
-            </a:r>
-            <a:r>
-              <a:rPr lang="en-US" sz="2400" dirty="0">
-                <a:solidFill>
-                  <a:srgbClr val="FF0000"/>
-                </a:solidFill>
-              </a:rPr>
-              <a:t>not in</a:t>
-            </a:r>
-            <a:r>
-              <a:rPr lang="en-US" sz="2400" dirty="0"/>
-              <a:t>.</a:t>
-            </a:r>
-          </a:p>
-          <a:p>
-            <a:r>
-              <a:rPr lang="en-US" sz="2400" dirty="0">
-                <a:solidFill>
-                  <a:srgbClr val="000000"/>
-                </a:solidFill>
-                <a:effectLst/>
-              </a:rPr>
-              <a:t>txt = </a:t>
-            </a:r>
-            <a:r>
-              <a:rPr lang="en-US" sz="2400" dirty="0">
-                <a:solidFill>
-                  <a:srgbClr val="008000"/>
-                </a:solidFill>
-                <a:effectLst/>
-              </a:rPr>
-              <a:t>"The best things in life are free!"</a:t>
-            </a:r>
-            <a:br>
-              <a:rPr lang="en-US" sz="2400" dirty="0">
-                <a:solidFill>
-                  <a:srgbClr val="000000"/>
-                </a:solidFill>
-                <a:effectLst/>
-              </a:rPr>
-            </a:br>
-            <a:r>
-              <a:rPr lang="en-US" sz="2400" dirty="0">
-                <a:solidFill>
-                  <a:srgbClr val="005CC5"/>
-                </a:solidFill>
-                <a:effectLst/>
-              </a:rPr>
-              <a:t>print</a:t>
-            </a:r>
-            <a:r>
-              <a:rPr lang="en-US" sz="2400" dirty="0">
-                <a:solidFill>
-                  <a:srgbClr val="000000"/>
-                </a:solidFill>
-                <a:effectLst/>
-              </a:rPr>
-              <a:t>(</a:t>
-            </a:r>
-            <a:r>
-              <a:rPr lang="en-US" sz="2400" dirty="0">
-                <a:solidFill>
-                  <a:srgbClr val="008000"/>
-                </a:solidFill>
-                <a:effectLst/>
-              </a:rPr>
-              <a:t>"expensive"</a:t>
-            </a:r>
-            <a:r>
-              <a:rPr lang="en-US" sz="2400" dirty="0">
-                <a:solidFill>
-                  <a:srgbClr val="000000"/>
-                </a:solidFill>
-                <a:effectLst/>
-              </a:rPr>
-              <a:t> not </a:t>
-            </a:r>
-            <a:r>
-              <a:rPr lang="en-US" sz="2400" dirty="0">
-                <a:solidFill>
-                  <a:srgbClr val="005CC5"/>
-                </a:solidFill>
-                <a:effectLst/>
-              </a:rPr>
-              <a:t>in</a:t>
-            </a:r>
-            <a:r>
-              <a:rPr lang="en-US" sz="2400" dirty="0">
-                <a:solidFill>
-                  <a:srgbClr val="000000"/>
-                </a:solidFill>
-                <a:effectLst/>
-              </a:rPr>
-              <a:t> txt)</a:t>
-            </a:r>
-            <a:endParaRPr lang="en-US" sz="3600" dirty="0"/>
-          </a:p>
-        </p:txBody>
-      </p:sp>
-      <p:sp>
-        <p:nvSpPr>
-          <p:cNvPr id="4" name="TextBox 3">
-            <a:extLst>
-              <a:ext uri="{FF2B5EF4-FFF2-40B4-BE49-F238E27FC236}">
-                <a16:creationId xmlns:a16="http://schemas.microsoft.com/office/drawing/2014/main" id="{26AE9647-0CFD-278E-DC72-FF410F182F52}"/>
-              </a:ext>
-            </a:extLst>
-          </p:cNvPr>
-          <p:cNvSpPr txBox="1"/>
-          <p:nvPr/>
-        </p:nvSpPr>
-        <p:spPr>
-          <a:xfrm>
-            <a:off x="628650" y="6311899"/>
-            <a:ext cx="5770041" cy="369332"/>
-          </a:xfrm>
-          <a:prstGeom prst="rect">
-            <a:avLst/>
-          </a:prstGeom>
-          <a:noFill/>
-        </p:spPr>
-        <p:txBody>
-          <a:bodyPr wrap="none" rtlCol="0">
-            <a:spAutoFit/>
-          </a:bodyPr>
-          <a:lstStyle/>
-          <a:p>
-            <a:r>
-              <a:rPr lang="tr-TR" dirty="0" err="1"/>
-              <a:t>https</a:t>
-            </a:r>
-            <a:r>
-              <a:rPr lang="tr-TR" dirty="0"/>
-              <a:t>://www.w3schools.com/</a:t>
-            </a:r>
-            <a:r>
-              <a:rPr lang="tr-TR" dirty="0" err="1"/>
-              <a:t>python</a:t>
-            </a:r>
-            <a:r>
-              <a:rPr lang="tr-TR" dirty="0"/>
-              <a:t>/</a:t>
-            </a:r>
-            <a:r>
-              <a:rPr lang="tr-TR" dirty="0" err="1"/>
-              <a:t>python_strings.asp</a:t>
-            </a:r>
-            <a:endParaRPr lang="tr-TR" dirty="0"/>
-          </a:p>
-        </p:txBody>
-      </p:sp>
-    </p:spTree>
-    <p:extLst>
-      <p:ext uri="{BB962C8B-B14F-4D97-AF65-F5344CB8AC3E}">
-        <p14:creationId xmlns:p14="http://schemas.microsoft.com/office/powerpoint/2010/main" val="2936963030"/>
       </p:ext>
     </p:extLst>
   </p:cSld>

</xml_diff>